<commit_message>
Slide 'Métodos Abstraidos' com printscreen
</commit_message>
<xml_diff>
--- a/Apresentação.pptx
+++ b/Apresentação.pptx
@@ -5,7 +5,7 @@
     <p:sldMasterId id="2147483648" r:id="rId1"/>
   </p:sldMasterIdLst>
   <p:notesMasterIdLst>
-    <p:notesMasterId r:id="rId11"/>
+    <p:notesMasterId r:id="rId12"/>
   </p:notesMasterIdLst>
   <p:sldIdLst>
     <p:sldId id="256" r:id="rId2"/>
@@ -17,6 +17,7 @@
     <p:sldId id="261" r:id="rId8"/>
     <p:sldId id="262" r:id="rId9"/>
     <p:sldId id="264" r:id="rId10"/>
+    <p:sldId id="265" r:id="rId11"/>
   </p:sldIdLst>
   <p:sldSz cx="9144000" cy="5143500" type="screen16x9"/>
   <p:notesSz cx="6858000" cy="9144000"/>
@@ -311,7 +312,6 @@
               <a:rPr lang="pt-BR"/>
               <a:t>Quinto nível</a:t>
             </a:r>
-            <a:endParaRPr lang="pt-BR"/>
           </a:p>
         </p:txBody>
       </p:sp>
@@ -1147,6 +1147,90 @@
     <p:extLst>
       <p:ext uri="{BB962C8B-B14F-4D97-AF65-F5344CB8AC3E}">
         <p14:creationId xmlns:p14="http://schemas.microsoft.com/office/powerpoint/2010/main" val="4225784004"/>
+      </p:ext>
+    </p:extLst>
+  </p:cSld>
+  <p:clrMapOvr>
+    <a:masterClrMapping/>
+  </p:clrMapOvr>
+</p:notes>
+</file>
+
+<file path=ppt/notesSlides/notesSlide9.xml><?xml version="1.0" encoding="utf-8"?>
+<p:notes xmlns:a="http://schemas.openxmlformats.org/drawingml/2006/main" xmlns:r="http://schemas.openxmlformats.org/officeDocument/2006/relationships" xmlns:p="http://schemas.openxmlformats.org/presentationml/2006/main">
+  <p:cSld>
+    <p:spTree>
+      <p:nvGrpSpPr>
+        <p:cNvPr id="1" name=""/>
+        <p:cNvGrpSpPr/>
+        <p:nvPr/>
+      </p:nvGrpSpPr>
+      <p:grpSpPr>
+        <a:xfrm>
+          <a:off x="0" y="0"/>
+          <a:ext cx="0" cy="0"/>
+          <a:chOff x="0" y="0"/>
+          <a:chExt cx="0" cy="0"/>
+        </a:xfrm>
+      </p:grpSpPr>
+      <p:sp>
+        <p:nvSpPr>
+          <p:cNvPr id="2" name="Espaço Reservado para Imagem de Slide 1"/>
+          <p:cNvSpPr>
+            <a:spLocks noGrp="1" noRot="1" noChangeAspect="1"/>
+          </p:cNvSpPr>
+          <p:nvPr>
+            <p:ph type="sldImg"/>
+          </p:nvPr>
+        </p:nvSpPr>
+        <p:spPr/>
+      </p:sp>
+      <p:sp>
+        <p:nvSpPr>
+          <p:cNvPr id="3" name="Espaço Reservado para Anotações 2"/>
+          <p:cNvSpPr>
+            <a:spLocks noGrp="1"/>
+          </p:cNvSpPr>
+          <p:nvPr>
+            <p:ph type="body" idx="1"/>
+          </p:nvPr>
+        </p:nvSpPr>
+        <p:spPr/>
+        <p:txBody>
+          <a:bodyPr/>
+          <a:lstStyle/>
+          <a:p>
+            <a:endParaRPr lang="pt-BR" dirty="0"/>
+          </a:p>
+        </p:txBody>
+      </p:sp>
+      <p:sp>
+        <p:nvSpPr>
+          <p:cNvPr id="4" name="Espaço Reservado para Número de Slide 3"/>
+          <p:cNvSpPr>
+            <a:spLocks noGrp="1"/>
+          </p:cNvSpPr>
+          <p:nvPr>
+            <p:ph type="sldNum" sz="quarter" idx="10"/>
+          </p:nvPr>
+        </p:nvSpPr>
+        <p:spPr/>
+        <p:txBody>
+          <a:bodyPr/>
+          <a:lstStyle/>
+          <a:p>
+            <a:fld id="{5374EABB-B752-462A-8FDC-DA8F402C3A13}" type="slidenum">
+              <a:rPr lang="pt-BR" smtClean="0"/>
+              <a:t>10</a:t>
+            </a:fld>
+            <a:endParaRPr lang="pt-BR"/>
+          </a:p>
+        </p:txBody>
+      </p:sp>
+    </p:spTree>
+    <p:extLst>
+      <p:ext uri="{BB962C8B-B14F-4D97-AF65-F5344CB8AC3E}">
+        <p14:creationId xmlns:p14="http://schemas.microsoft.com/office/powerpoint/2010/main" val="851712730"/>
       </p:ext>
     </p:extLst>
   </p:cSld>
@@ -1721,7 +1805,7 @@
 </p:sld>
 </file>
 
-<file path=ppt/slides/slide2.xml><?xml version="1.0" encoding="utf-8"?>
+<file path=ppt/slides/slide10.xml><?xml version="1.0" encoding="utf-8"?>
 <p:sld xmlns:a="http://schemas.openxmlformats.org/drawingml/2006/main" xmlns:r="http://schemas.openxmlformats.org/officeDocument/2006/relationships" xmlns:p="http://schemas.openxmlformats.org/presentationml/2006/main">
   <p:cSld>
     <p:spTree>
@@ -1780,6 +1864,146 @@
                 <a:ea typeface="맑은 고딕" pitchFamily="50" charset="-127"/>
                 <a:cs typeface="Arial" pitchFamily="34" charset="0"/>
               </a:rPr>
+              <a:t>  JPA - MÉTODOS ABSTRAÍDOS</a:t>
+            </a:r>
+          </a:p>
+        </p:txBody>
+      </p:sp>
+      <p:pic>
+        <p:nvPicPr>
+          <p:cNvPr id="4" name="Imagem 3"/>
+          <p:cNvPicPr>
+            <a:picLocks noChangeAspect="1"/>
+          </p:cNvPicPr>
+          <p:nvPr/>
+        </p:nvPicPr>
+        <p:blipFill>
+          <a:blip r:embed="rId3">
+            <a:extLst>
+              <a:ext uri="{28A0092B-C50C-407E-A947-70E740481C1C}">
+                <a14:useLocalDpi xmlns:a14="http://schemas.microsoft.com/office/drawing/2010/main" val="0"/>
+              </a:ext>
+            </a:extLst>
+          </a:blip>
+          <a:stretch>
+            <a:fillRect/>
+          </a:stretch>
+        </p:blipFill>
+        <p:spPr>
+          <a:xfrm>
+            <a:off x="323444" y="1176255"/>
+            <a:ext cx="4752612" cy="3478569"/>
+          </a:xfrm>
+          <a:prstGeom prst="rect">
+            <a:avLst/>
+          </a:prstGeom>
+          <a:solidFill>
+            <a:srgbClr val="FFFFFF">
+              <a:shade val="85000"/>
+            </a:srgbClr>
+          </a:solidFill>
+          <a:ln w="88900" cap="sq">
+            <a:solidFill>
+              <a:srgbClr val="FFFFFF"/>
+            </a:solidFill>
+            <a:miter lim="800000"/>
+          </a:ln>
+          <a:effectLst>
+            <a:outerShdw blurRad="55000" dist="18000" dir="5400000" algn="tl" rotWithShape="0">
+              <a:srgbClr val="000000">
+                <a:alpha val="40000"/>
+              </a:srgbClr>
+            </a:outerShdw>
+          </a:effectLst>
+          <a:scene3d>
+            <a:camera prst="orthographicFront"/>
+            <a:lightRig rig="twoPt" dir="t">
+              <a:rot lat="0" lon="0" rev="7200000"/>
+            </a:lightRig>
+          </a:scene3d>
+          <a:sp3d>
+            <a:bevelT w="25400" h="19050"/>
+            <a:contourClr>
+              <a:srgbClr val="FFFFFF"/>
+            </a:contourClr>
+          </a:sp3d>
+        </p:spPr>
+      </p:pic>
+    </p:spTree>
+    <p:extLst>
+      <p:ext uri="{BB962C8B-B14F-4D97-AF65-F5344CB8AC3E}">
+        <p14:creationId xmlns:p14="http://schemas.microsoft.com/office/powerpoint/2010/main" val="2404566520"/>
+      </p:ext>
+    </p:extLst>
+  </p:cSld>
+  <p:clrMapOvr>
+    <a:masterClrMapping/>
+  </p:clrMapOvr>
+  <p:transition spd="slow">
+    <p:cover/>
+  </p:transition>
+</p:sld>
+</file>
+
+<file path=ppt/slides/slide2.xml><?xml version="1.0" encoding="utf-8"?>
+<p:sld xmlns:a="http://schemas.openxmlformats.org/drawingml/2006/main" xmlns:r="http://schemas.openxmlformats.org/officeDocument/2006/relationships" xmlns:p="http://schemas.openxmlformats.org/presentationml/2006/main">
+  <p:cSld>
+    <p:spTree>
+      <p:nvGrpSpPr>
+        <p:cNvPr id="1" name=""/>
+        <p:cNvGrpSpPr/>
+        <p:nvPr/>
+      </p:nvGrpSpPr>
+      <p:grpSpPr>
+        <a:xfrm>
+          <a:off x="0" y="0"/>
+          <a:ext cx="0" cy="0"/>
+          <a:chOff x="0" y="0"/>
+          <a:chExt cx="0" cy="0"/>
+        </a:xfrm>
+      </p:grpSpPr>
+      <p:sp>
+        <p:nvSpPr>
+          <p:cNvPr id="2" name="TextBox 1"/>
+          <p:cNvSpPr txBox="1">
+            <a:spLocks noChangeArrowheads="1"/>
+          </p:cNvSpPr>
+          <p:nvPr/>
+        </p:nvSpPr>
+        <p:spPr bwMode="auto">
+          <a:xfrm>
+            <a:off x="1588" y="125219"/>
+            <a:ext cx="9142412" cy="646331"/>
+          </a:xfrm>
+          <a:prstGeom prst="rect">
+            <a:avLst/>
+          </a:prstGeom>
+          <a:noFill/>
+          <a:ln w="9525">
+            <a:noFill/>
+            <a:miter lim="800000"/>
+            <a:headEnd/>
+            <a:tailEnd/>
+          </a:ln>
+        </p:spPr>
+        <p:txBody>
+          <a:bodyPr wrap="square">
+            <a:spAutoFit/>
+          </a:bodyPr>
+          <a:lstStyle/>
+          <a:p>
+            <a:r>
+              <a:rPr lang="en-US" altLang="ko-KR" sz="3600" b="1" dirty="0">
+                <a:solidFill>
+                  <a:schemeClr val="tx1">
+                    <a:lumMod val="65000"/>
+                    <a:lumOff val="35000"/>
+                  </a:schemeClr>
+                </a:solidFill>
+                <a:latin typeface="Arial" pitchFamily="34" charset="0"/>
+                <a:ea typeface="맑은 고딕" pitchFamily="50" charset="-127"/>
+                <a:cs typeface="Arial" pitchFamily="34" charset="0"/>
+              </a:rPr>
               <a:t>  ANÁLISE DO PROBLEMA</a:t>
             </a:r>
           </a:p>
@@ -1891,13 +2115,13 @@
   <p:clrMapOvr>
     <a:masterClrMapping/>
   </p:clrMapOvr>
-  <mc:AlternateContent xmlns:mc="http://schemas.openxmlformats.org/markup-compatibility/2006">
-    <mc:Choice xmlns:p14="http://schemas.microsoft.com/office/powerpoint/2010/main" Requires="p14">
+  <mc:AlternateContent xmlns:mc="http://schemas.openxmlformats.org/markup-compatibility/2006" xmlns:p14="http://schemas.microsoft.com/office/powerpoint/2010/main">
+    <mc:Choice Requires="p14">
       <p:transition spd="slow" p14:dur="800">
         <p:circle/>
       </p:transition>
     </mc:Choice>
-    <mc:Fallback>
+    <mc:Fallback xmlns="">
       <p:transition spd="slow">
         <p:circle/>
       </p:transition>

</xml_diff>

<commit_message>
Slide 'JPA - Implementações'
</commit_message>
<xml_diff>
--- a/Apresentação.pptx
+++ b/Apresentação.pptx
@@ -5,7 +5,7 @@
     <p:sldMasterId id="2147483648" r:id="rId1"/>
   </p:sldMasterIdLst>
   <p:notesMasterIdLst>
-    <p:notesMasterId r:id="rId12"/>
+    <p:notesMasterId r:id="rId13"/>
   </p:notesMasterIdLst>
   <p:sldIdLst>
     <p:sldId id="256" r:id="rId2"/>
@@ -18,6 +18,7 @@
     <p:sldId id="262" r:id="rId9"/>
     <p:sldId id="264" r:id="rId10"/>
     <p:sldId id="265" r:id="rId11"/>
+    <p:sldId id="266" r:id="rId12"/>
   </p:sldIdLst>
   <p:sldSz cx="9144000" cy="5143500" type="screen16x9"/>
   <p:notesSz cx="6858000" cy="9144000"/>
@@ -559,6 +560,90 @@
     <p:extLst>
       <p:ext uri="{BB962C8B-B14F-4D97-AF65-F5344CB8AC3E}">
         <p14:creationId xmlns:p14="http://schemas.microsoft.com/office/powerpoint/2010/main" val="2284026279"/>
+      </p:ext>
+    </p:extLst>
+  </p:cSld>
+  <p:clrMapOvr>
+    <a:masterClrMapping/>
+  </p:clrMapOvr>
+</p:notes>
+</file>
+
+<file path=ppt/notesSlides/notesSlide10.xml><?xml version="1.0" encoding="utf-8"?>
+<p:notes xmlns:a="http://schemas.openxmlformats.org/drawingml/2006/main" xmlns:r="http://schemas.openxmlformats.org/officeDocument/2006/relationships" xmlns:p="http://schemas.openxmlformats.org/presentationml/2006/main">
+  <p:cSld>
+    <p:spTree>
+      <p:nvGrpSpPr>
+        <p:cNvPr id="1" name=""/>
+        <p:cNvGrpSpPr/>
+        <p:nvPr/>
+      </p:nvGrpSpPr>
+      <p:grpSpPr>
+        <a:xfrm>
+          <a:off x="0" y="0"/>
+          <a:ext cx="0" cy="0"/>
+          <a:chOff x="0" y="0"/>
+          <a:chExt cx="0" cy="0"/>
+        </a:xfrm>
+      </p:grpSpPr>
+      <p:sp>
+        <p:nvSpPr>
+          <p:cNvPr id="2" name="Espaço Reservado para Imagem de Slide 1"/>
+          <p:cNvSpPr>
+            <a:spLocks noGrp="1" noRot="1" noChangeAspect="1"/>
+          </p:cNvSpPr>
+          <p:nvPr>
+            <p:ph type="sldImg"/>
+          </p:nvPr>
+        </p:nvSpPr>
+        <p:spPr/>
+      </p:sp>
+      <p:sp>
+        <p:nvSpPr>
+          <p:cNvPr id="3" name="Espaço Reservado para Anotações 2"/>
+          <p:cNvSpPr>
+            <a:spLocks noGrp="1"/>
+          </p:cNvSpPr>
+          <p:nvPr>
+            <p:ph type="body" idx="1"/>
+          </p:nvPr>
+        </p:nvSpPr>
+        <p:spPr/>
+        <p:txBody>
+          <a:bodyPr/>
+          <a:lstStyle/>
+          <a:p>
+            <a:endParaRPr lang="pt-BR" dirty="0"/>
+          </a:p>
+        </p:txBody>
+      </p:sp>
+      <p:sp>
+        <p:nvSpPr>
+          <p:cNvPr id="4" name="Espaço Reservado para Número de Slide 3"/>
+          <p:cNvSpPr>
+            <a:spLocks noGrp="1"/>
+          </p:cNvSpPr>
+          <p:nvPr>
+            <p:ph type="sldNum" sz="quarter" idx="10"/>
+          </p:nvPr>
+        </p:nvSpPr>
+        <p:spPr/>
+        <p:txBody>
+          <a:bodyPr/>
+          <a:lstStyle/>
+          <a:p>
+            <a:fld id="{5374EABB-B752-462A-8FDC-DA8F402C3A13}" type="slidenum">
+              <a:rPr lang="pt-BR" smtClean="0"/>
+              <a:t>11</a:t>
+            </a:fld>
+            <a:endParaRPr lang="pt-BR"/>
+          </a:p>
+        </p:txBody>
+      </p:sp>
+    </p:spTree>
+    <p:extLst>
+      <p:ext uri="{BB962C8B-B14F-4D97-AF65-F5344CB8AC3E}">
+        <p14:creationId xmlns:p14="http://schemas.microsoft.com/office/powerpoint/2010/main" val="562068361"/>
       </p:ext>
     </p:extLst>
   </p:cSld>
@@ -1933,6 +2018,360 @@
     <p:extLst>
       <p:ext uri="{BB962C8B-B14F-4D97-AF65-F5344CB8AC3E}">
         <p14:creationId xmlns:p14="http://schemas.microsoft.com/office/powerpoint/2010/main" val="2404566520"/>
+      </p:ext>
+    </p:extLst>
+  </p:cSld>
+  <p:clrMapOvr>
+    <a:masterClrMapping/>
+  </p:clrMapOvr>
+  <p:transition spd="slow">
+    <p:cover/>
+  </p:transition>
+</p:sld>
+</file>
+
+<file path=ppt/slides/slide11.xml><?xml version="1.0" encoding="utf-8"?>
+<p:sld xmlns:a="http://schemas.openxmlformats.org/drawingml/2006/main" xmlns:r="http://schemas.openxmlformats.org/officeDocument/2006/relationships" xmlns:p="http://schemas.openxmlformats.org/presentationml/2006/main">
+  <p:cSld>
+    <p:spTree>
+      <p:nvGrpSpPr>
+        <p:cNvPr id="1" name=""/>
+        <p:cNvGrpSpPr/>
+        <p:nvPr/>
+      </p:nvGrpSpPr>
+      <p:grpSpPr>
+        <a:xfrm>
+          <a:off x="0" y="0"/>
+          <a:ext cx="0" cy="0"/>
+          <a:chOff x="0" y="0"/>
+          <a:chExt cx="0" cy="0"/>
+        </a:xfrm>
+      </p:grpSpPr>
+      <p:sp>
+        <p:nvSpPr>
+          <p:cNvPr id="2" name="TextBox 1"/>
+          <p:cNvSpPr txBox="1">
+            <a:spLocks noChangeArrowheads="1"/>
+          </p:cNvSpPr>
+          <p:nvPr/>
+        </p:nvSpPr>
+        <p:spPr bwMode="auto">
+          <a:xfrm>
+            <a:off x="1588" y="125219"/>
+            <a:ext cx="9142412" cy="646331"/>
+          </a:xfrm>
+          <a:prstGeom prst="rect">
+            <a:avLst/>
+          </a:prstGeom>
+          <a:noFill/>
+          <a:ln w="9525">
+            <a:noFill/>
+            <a:miter lim="800000"/>
+            <a:headEnd/>
+            <a:tailEnd/>
+          </a:ln>
+        </p:spPr>
+        <p:txBody>
+          <a:bodyPr wrap="square">
+            <a:spAutoFit/>
+          </a:bodyPr>
+          <a:lstStyle/>
+          <a:p>
+            <a:r>
+              <a:rPr lang="en-US" altLang="ko-KR" sz="3600" b="1" dirty="0">
+                <a:solidFill>
+                  <a:schemeClr val="tx1">
+                    <a:lumMod val="65000"/>
+                    <a:lumOff val="35000"/>
+                  </a:schemeClr>
+                </a:solidFill>
+                <a:latin typeface="Arial" pitchFamily="34" charset="0"/>
+                <a:ea typeface="맑은 고딕" pitchFamily="50" charset="-127"/>
+                <a:cs typeface="Arial" pitchFamily="34" charset="0"/>
+              </a:rPr>
+              <a:t>  JPA - IMPLEMENTAÇÕES</a:t>
+            </a:r>
+          </a:p>
+        </p:txBody>
+      </p:sp>
+      <p:sp>
+        <p:nvSpPr>
+          <p:cNvPr id="3" name="CaixaDeTexto 2"/>
+          <p:cNvSpPr txBox="1"/>
+          <p:nvPr/>
+        </p:nvSpPr>
+        <p:spPr>
+          <a:xfrm>
+            <a:off x="324322" y="1176254"/>
+            <a:ext cx="8496944" cy="3416320"/>
+          </a:xfrm>
+          <a:prstGeom prst="rect">
+            <a:avLst/>
+          </a:prstGeom>
+          <a:noFill/>
+        </p:spPr>
+        <p:txBody>
+          <a:bodyPr wrap="square" rtlCol="0">
+            <a:spAutoFit/>
+          </a:bodyPr>
+          <a:lstStyle/>
+          <a:p>
+            <a:pPr algn="just"/>
+            <a:r>
+              <a:rPr lang="pt-BR" dirty="0">
+                <a:solidFill>
+                  <a:schemeClr val="tx1">
+                    <a:lumMod val="85000"/>
+                    <a:lumOff val="15000"/>
+                  </a:schemeClr>
+                </a:solidFill>
+                <a:latin typeface="Arial" panose="020B0604020202020204" pitchFamily="34" charset="0"/>
+                <a:cs typeface="Arial" panose="020B0604020202020204" pitchFamily="34" charset="0"/>
+              </a:rPr>
+              <a:t>A JPA é uma API que descreve uma interface comum para Frameworks de persistência de dados, portanto necessita de uma implementação. Alguns exemplos de implementações são:</a:t>
+            </a:r>
+          </a:p>
+          <a:p>
+            <a:pPr algn="just"/>
+            <a:endParaRPr lang="pt-BR" dirty="0">
+              <a:solidFill>
+                <a:schemeClr val="tx1">
+                  <a:lumMod val="85000"/>
+                  <a:lumOff val="15000"/>
+                </a:schemeClr>
+              </a:solidFill>
+              <a:latin typeface="Arial" panose="020B0604020202020204" pitchFamily="34" charset="0"/>
+              <a:cs typeface="Arial" panose="020B0604020202020204" pitchFamily="34" charset="0"/>
+            </a:endParaRPr>
+          </a:p>
+          <a:p>
+            <a:pPr indent="-285750" algn="just">
+              <a:buFont typeface="Arial" panose="020B0604020202020204" pitchFamily="34" charset="0"/>
+              <a:buChar char="‒"/>
+            </a:pPr>
+            <a:r>
+              <a:rPr lang="pt-BR" dirty="0" err="1">
+                <a:solidFill>
+                  <a:schemeClr val="tx1">
+                    <a:lumMod val="85000"/>
+                    <a:lumOff val="15000"/>
+                  </a:schemeClr>
+                </a:solidFill>
+                <a:latin typeface="Arial" panose="020B0604020202020204" pitchFamily="34" charset="0"/>
+                <a:cs typeface="Arial" panose="020B0604020202020204" pitchFamily="34" charset="0"/>
+              </a:rPr>
+              <a:t>Hibernate</a:t>
+            </a:r>
+            <a:endParaRPr lang="pt-BR" dirty="0">
+              <a:solidFill>
+                <a:schemeClr val="tx1">
+                  <a:lumMod val="85000"/>
+                  <a:lumOff val="15000"/>
+                </a:schemeClr>
+              </a:solidFill>
+              <a:latin typeface="Arial" panose="020B0604020202020204" pitchFamily="34" charset="0"/>
+              <a:cs typeface="Arial" panose="020B0604020202020204" pitchFamily="34" charset="0"/>
+            </a:endParaRPr>
+          </a:p>
+          <a:p>
+            <a:pPr indent="-285750" algn="just">
+              <a:buFont typeface="Arial" panose="020B0604020202020204" pitchFamily="34" charset="0"/>
+              <a:buChar char="‒"/>
+            </a:pPr>
+            <a:r>
+              <a:rPr lang="pt-BR" dirty="0" err="1">
+                <a:solidFill>
+                  <a:schemeClr val="tx1">
+                    <a:lumMod val="85000"/>
+                    <a:lumOff val="15000"/>
+                  </a:schemeClr>
+                </a:solidFill>
+                <a:latin typeface="Arial" panose="020B0604020202020204" pitchFamily="34" charset="0"/>
+                <a:cs typeface="Arial" panose="020B0604020202020204" pitchFamily="34" charset="0"/>
+              </a:rPr>
+              <a:t>EclipseLink</a:t>
+            </a:r>
+            <a:endParaRPr lang="pt-BR" dirty="0">
+              <a:solidFill>
+                <a:schemeClr val="tx1">
+                  <a:lumMod val="85000"/>
+                  <a:lumOff val="15000"/>
+                </a:schemeClr>
+              </a:solidFill>
+              <a:latin typeface="Arial" panose="020B0604020202020204" pitchFamily="34" charset="0"/>
+              <a:cs typeface="Arial" panose="020B0604020202020204" pitchFamily="34" charset="0"/>
+            </a:endParaRPr>
+          </a:p>
+          <a:p>
+            <a:pPr indent="-285750" algn="just">
+              <a:buFont typeface="Arial" panose="020B0604020202020204" pitchFamily="34" charset="0"/>
+              <a:buChar char="‒"/>
+            </a:pPr>
+            <a:r>
+              <a:rPr lang="pt-BR" dirty="0" err="1">
+                <a:solidFill>
+                  <a:schemeClr val="tx1">
+                    <a:lumMod val="85000"/>
+                    <a:lumOff val="15000"/>
+                  </a:schemeClr>
+                </a:solidFill>
+                <a:latin typeface="Arial" panose="020B0604020202020204" pitchFamily="34" charset="0"/>
+                <a:cs typeface="Arial" panose="020B0604020202020204" pitchFamily="34" charset="0"/>
+              </a:rPr>
+              <a:t>TopLink</a:t>
+            </a:r>
+            <a:endParaRPr lang="pt-BR" dirty="0">
+              <a:solidFill>
+                <a:schemeClr val="tx1">
+                  <a:lumMod val="85000"/>
+                  <a:lumOff val="15000"/>
+                </a:schemeClr>
+              </a:solidFill>
+              <a:latin typeface="Arial" panose="020B0604020202020204" pitchFamily="34" charset="0"/>
+              <a:cs typeface="Arial" panose="020B0604020202020204" pitchFamily="34" charset="0"/>
+            </a:endParaRPr>
+          </a:p>
+          <a:p>
+            <a:pPr indent="-285750" algn="just">
+              <a:buFont typeface="Arial" panose="020B0604020202020204" pitchFamily="34" charset="0"/>
+              <a:buChar char="‒"/>
+            </a:pPr>
+            <a:r>
+              <a:rPr lang="pt-BR" dirty="0" err="1">
+                <a:solidFill>
+                  <a:schemeClr val="tx1">
+                    <a:lumMod val="85000"/>
+                    <a:lumOff val="15000"/>
+                  </a:schemeClr>
+                </a:solidFill>
+                <a:latin typeface="Arial" panose="020B0604020202020204" pitchFamily="34" charset="0"/>
+                <a:cs typeface="Arial" panose="020B0604020202020204" pitchFamily="34" charset="0"/>
+              </a:rPr>
+              <a:t>DataNucleus</a:t>
+            </a:r>
+            <a:endParaRPr lang="pt-BR" dirty="0">
+              <a:solidFill>
+                <a:schemeClr val="tx1">
+                  <a:lumMod val="85000"/>
+                  <a:lumOff val="15000"/>
+                </a:schemeClr>
+              </a:solidFill>
+              <a:latin typeface="Arial" panose="020B0604020202020204" pitchFamily="34" charset="0"/>
+              <a:cs typeface="Arial" panose="020B0604020202020204" pitchFamily="34" charset="0"/>
+            </a:endParaRPr>
+          </a:p>
+          <a:p>
+            <a:pPr indent="-285750" algn="just">
+              <a:buFont typeface="Arial" panose="020B0604020202020204" pitchFamily="34" charset="0"/>
+              <a:buChar char="‒"/>
+            </a:pPr>
+            <a:r>
+              <a:rPr lang="pt-BR" dirty="0" err="1">
+                <a:solidFill>
+                  <a:schemeClr val="tx1">
+                    <a:lumMod val="85000"/>
+                    <a:lumOff val="15000"/>
+                  </a:schemeClr>
+                </a:solidFill>
+                <a:latin typeface="Arial" panose="020B0604020202020204" pitchFamily="34" charset="0"/>
+                <a:cs typeface="Arial" panose="020B0604020202020204" pitchFamily="34" charset="0"/>
+              </a:rPr>
+              <a:t>OpenJPA</a:t>
+            </a:r>
+            <a:endParaRPr lang="pt-BR" dirty="0">
+              <a:solidFill>
+                <a:schemeClr val="tx1">
+                  <a:lumMod val="85000"/>
+                  <a:lumOff val="15000"/>
+                </a:schemeClr>
+              </a:solidFill>
+              <a:latin typeface="Arial" panose="020B0604020202020204" pitchFamily="34" charset="0"/>
+              <a:cs typeface="Arial" panose="020B0604020202020204" pitchFamily="34" charset="0"/>
+            </a:endParaRPr>
+          </a:p>
+          <a:p>
+            <a:pPr indent="-285750" algn="just">
+              <a:buFont typeface="Arial" panose="020B0604020202020204" pitchFamily="34" charset="0"/>
+              <a:buChar char="‒"/>
+            </a:pPr>
+            <a:r>
+              <a:rPr lang="pt-BR" dirty="0" err="1">
+                <a:solidFill>
+                  <a:schemeClr val="tx1">
+                    <a:lumMod val="85000"/>
+                    <a:lumOff val="15000"/>
+                  </a:schemeClr>
+                </a:solidFill>
+                <a:latin typeface="Arial" panose="020B0604020202020204" pitchFamily="34" charset="0"/>
+                <a:cs typeface="Arial" panose="020B0604020202020204" pitchFamily="34" charset="0"/>
+              </a:rPr>
+              <a:t>ObjectDB</a:t>
+            </a:r>
+            <a:endParaRPr lang="pt-BR" dirty="0">
+              <a:solidFill>
+                <a:schemeClr val="tx1">
+                  <a:lumMod val="85000"/>
+                  <a:lumOff val="15000"/>
+                </a:schemeClr>
+              </a:solidFill>
+              <a:latin typeface="Arial" panose="020B0604020202020204" pitchFamily="34" charset="0"/>
+              <a:cs typeface="Arial" panose="020B0604020202020204" pitchFamily="34" charset="0"/>
+            </a:endParaRPr>
+          </a:p>
+          <a:p>
+            <a:pPr indent="-285750" algn="just">
+              <a:buFont typeface="Arial" panose="020B0604020202020204" pitchFamily="34" charset="0"/>
+              <a:buChar char="‒"/>
+            </a:pPr>
+            <a:r>
+              <a:rPr lang="pt-BR" dirty="0" err="1">
+                <a:solidFill>
+                  <a:schemeClr val="tx1">
+                    <a:lumMod val="85000"/>
+                    <a:lumOff val="15000"/>
+                  </a:schemeClr>
+                </a:solidFill>
+                <a:latin typeface="Arial" panose="020B0604020202020204" pitchFamily="34" charset="0"/>
+                <a:cs typeface="Arial" panose="020B0604020202020204" pitchFamily="34" charset="0"/>
+              </a:rPr>
+              <a:t>Ebean</a:t>
+            </a:r>
+            <a:endParaRPr lang="pt-BR" dirty="0">
+              <a:solidFill>
+                <a:schemeClr val="tx1">
+                  <a:lumMod val="85000"/>
+                  <a:lumOff val="15000"/>
+                </a:schemeClr>
+              </a:solidFill>
+              <a:latin typeface="Arial" panose="020B0604020202020204" pitchFamily="34" charset="0"/>
+              <a:cs typeface="Arial" panose="020B0604020202020204" pitchFamily="34" charset="0"/>
+            </a:endParaRPr>
+          </a:p>
+          <a:p>
+            <a:pPr marL="285750" indent="-285750" algn="just">
+              <a:buClr>
+                <a:srgbClr val="C00000"/>
+              </a:buClr>
+              <a:buFont typeface="Arial" panose="020B0604020202020204" pitchFamily="34" charset="0"/>
+              <a:buChar char="X"/>
+            </a:pPr>
+            <a:endParaRPr lang="pt-BR" dirty="0">
+              <a:solidFill>
+                <a:schemeClr val="tx1">
+                  <a:lumMod val="85000"/>
+                  <a:lumOff val="15000"/>
+                </a:schemeClr>
+              </a:solidFill>
+              <a:latin typeface="Arial" panose="020B0604020202020204" pitchFamily="34" charset="0"/>
+              <a:cs typeface="Arial" panose="020B0604020202020204" pitchFamily="34" charset="0"/>
+            </a:endParaRPr>
+          </a:p>
+        </p:txBody>
+      </p:sp>
+    </p:spTree>
+    <p:extLst>
+      <p:ext uri="{BB962C8B-B14F-4D97-AF65-F5344CB8AC3E}">
+        <p14:creationId xmlns:p14="http://schemas.microsoft.com/office/powerpoint/2010/main" val="4021511116"/>
       </p:ext>
     </p:extLst>
   </p:cSld>

</xml_diff>

<commit_message>
Alterada ordem dos slides
</commit_message>
<xml_diff>
--- a/Apresentação.pptx
+++ b/Apresentação.pptx
@@ -14,8 +14,8 @@
     <p:sldId id="259" r:id="rId5"/>
     <p:sldId id="260" r:id="rId6"/>
     <p:sldId id="263" r:id="rId7"/>
-    <p:sldId id="261" r:id="rId8"/>
-    <p:sldId id="262" r:id="rId9"/>
+    <p:sldId id="262" r:id="rId8"/>
+    <p:sldId id="261" r:id="rId9"/>
     <p:sldId id="264" r:id="rId10"/>
     <p:sldId id="265" r:id="rId11"/>
     <p:sldId id="266" r:id="rId12"/>
@@ -1063,7 +1063,7 @@
     </p:spTree>
     <p:extLst>
       <p:ext uri="{BB962C8B-B14F-4D97-AF65-F5344CB8AC3E}">
-        <p14:creationId xmlns:p14="http://schemas.microsoft.com/office/powerpoint/2010/main" val="4065109122"/>
+        <p14:creationId xmlns:p14="http://schemas.microsoft.com/office/powerpoint/2010/main" val="1550241845"/>
       </p:ext>
     </p:extLst>
   </p:cSld>
@@ -1147,7 +1147,7 @@
     </p:spTree>
     <p:extLst>
       <p:ext uri="{BB962C8B-B14F-4D97-AF65-F5344CB8AC3E}">
-        <p14:creationId xmlns:p14="http://schemas.microsoft.com/office/powerpoint/2010/main" val="1550241845"/>
+        <p14:creationId xmlns:p14="http://schemas.microsoft.com/office/powerpoint/2010/main" val="4065109122"/>
       </p:ext>
     </p:extLst>
   </p:cSld>
@@ -3419,6 +3419,275 @@
           <a:chExt cx="0" cy="0"/>
         </a:xfrm>
       </p:grpSpPr>
+      <p:sp>
+        <p:nvSpPr>
+          <p:cNvPr id="2" name="TextBox 1"/>
+          <p:cNvSpPr txBox="1">
+            <a:spLocks noChangeArrowheads="1"/>
+          </p:cNvSpPr>
+          <p:nvPr/>
+        </p:nvSpPr>
+        <p:spPr bwMode="auto">
+          <a:xfrm>
+            <a:off x="1588" y="125219"/>
+            <a:ext cx="9142412" cy="646331"/>
+          </a:xfrm>
+          <a:prstGeom prst="rect">
+            <a:avLst/>
+          </a:prstGeom>
+          <a:noFill/>
+          <a:ln w="9525">
+            <a:noFill/>
+            <a:miter lim="800000"/>
+            <a:headEnd/>
+            <a:tailEnd/>
+          </a:ln>
+        </p:spPr>
+        <p:txBody>
+          <a:bodyPr wrap="square">
+            <a:spAutoFit/>
+          </a:bodyPr>
+          <a:lstStyle/>
+          <a:p>
+            <a:r>
+              <a:rPr lang="en-US" altLang="ko-KR" sz="3600" b="1" dirty="0">
+                <a:solidFill>
+                  <a:schemeClr val="tx1">
+                    <a:lumMod val="65000"/>
+                    <a:lumOff val="35000"/>
+                  </a:schemeClr>
+                </a:solidFill>
+                <a:latin typeface="Arial" pitchFamily="34" charset="0"/>
+                <a:ea typeface="맑은 고딕" pitchFamily="50" charset="-127"/>
+                <a:cs typeface="Arial" pitchFamily="34" charset="0"/>
+              </a:rPr>
+              <a:t>  JAVA PERSISTENCE API</a:t>
+            </a:r>
+          </a:p>
+        </p:txBody>
+      </p:sp>
+      <p:sp>
+        <p:nvSpPr>
+          <p:cNvPr id="3" name="CaixaDeTexto 2"/>
+          <p:cNvSpPr txBox="1"/>
+          <p:nvPr/>
+        </p:nvSpPr>
+        <p:spPr>
+          <a:xfrm>
+            <a:off x="324322" y="1176254"/>
+            <a:ext cx="8496944" cy="2585323"/>
+          </a:xfrm>
+          <a:prstGeom prst="rect">
+            <a:avLst/>
+          </a:prstGeom>
+          <a:noFill/>
+        </p:spPr>
+        <p:txBody>
+          <a:bodyPr wrap="square" rtlCol="0">
+            <a:spAutoFit/>
+          </a:bodyPr>
+          <a:lstStyle/>
+          <a:p>
+            <a:pPr algn="just"/>
+            <a:r>
+              <a:rPr lang="pt-BR" dirty="0">
+                <a:solidFill>
+                  <a:schemeClr val="tx1">
+                    <a:lumMod val="85000"/>
+                    <a:lumOff val="15000"/>
+                  </a:schemeClr>
+                </a:solidFill>
+                <a:latin typeface="Arial" panose="020B0604020202020204" pitchFamily="34" charset="0"/>
+                <a:cs typeface="Arial" panose="020B0604020202020204" pitchFamily="34" charset="0"/>
+              </a:rPr>
+              <a:t>A Java </a:t>
+            </a:r>
+            <a:r>
+              <a:rPr lang="pt-BR" dirty="0" err="1">
+                <a:solidFill>
+                  <a:schemeClr val="tx1">
+                    <a:lumMod val="85000"/>
+                    <a:lumOff val="15000"/>
+                  </a:schemeClr>
+                </a:solidFill>
+                <a:latin typeface="Arial" panose="020B0604020202020204" pitchFamily="34" charset="0"/>
+                <a:cs typeface="Arial" panose="020B0604020202020204" pitchFamily="34" charset="0"/>
+              </a:rPr>
+              <a:t>Persistence</a:t>
+            </a:r>
+            <a:r>
+              <a:rPr lang="pt-BR" dirty="0">
+                <a:solidFill>
+                  <a:schemeClr val="tx1">
+                    <a:lumMod val="85000"/>
+                    <a:lumOff val="15000"/>
+                  </a:schemeClr>
+                </a:solidFill>
+                <a:latin typeface="Arial" panose="020B0604020202020204" pitchFamily="34" charset="0"/>
+                <a:cs typeface="Arial" panose="020B0604020202020204" pitchFamily="34" charset="0"/>
+              </a:rPr>
+              <a:t> API (JPA) é uma camada de abstração para persistência de dados, onde utilizamos anotações para realizar o mapeamento ORM e métodos abstraídos para manipular o banco de dados.</a:t>
+            </a:r>
+          </a:p>
+          <a:p>
+            <a:pPr algn="just">
+              <a:buClr>
+                <a:srgbClr val="C00000"/>
+              </a:buClr>
+            </a:pPr>
+            <a:endParaRPr lang="pt-BR" dirty="0">
+              <a:solidFill>
+                <a:schemeClr val="tx1">
+                  <a:lumMod val="85000"/>
+                  <a:lumOff val="15000"/>
+                </a:schemeClr>
+              </a:solidFill>
+              <a:latin typeface="Arial" panose="020B0604020202020204" pitchFamily="34" charset="0"/>
+              <a:cs typeface="Arial" panose="020B0604020202020204" pitchFamily="34" charset="0"/>
+            </a:endParaRPr>
+          </a:p>
+          <a:p>
+            <a:pPr marL="285750" indent="-285750" algn="just">
+              <a:buClr>
+                <a:srgbClr val="00B050"/>
+              </a:buClr>
+              <a:buFont typeface="Wingdings" panose="05000000000000000000" pitchFamily="2" charset="2"/>
+              <a:buChar char="ü"/>
+            </a:pPr>
+            <a:r>
+              <a:rPr lang="pt-BR" dirty="0">
+                <a:solidFill>
+                  <a:schemeClr val="tx1">
+                    <a:lumMod val="85000"/>
+                    <a:lumOff val="15000"/>
+                  </a:schemeClr>
+                </a:solidFill>
+                <a:latin typeface="Arial" panose="020B0604020202020204" pitchFamily="34" charset="0"/>
+                <a:cs typeface="Arial" panose="020B0604020202020204" pitchFamily="34" charset="0"/>
+              </a:rPr>
+              <a:t>Abstração em relação ao SGBD a ser utilizado</a:t>
+            </a:r>
+          </a:p>
+          <a:p>
+            <a:pPr marL="285750" indent="-285750" algn="just">
+              <a:buClr>
+                <a:srgbClr val="00B050"/>
+              </a:buClr>
+              <a:buFont typeface="Wingdings" panose="05000000000000000000" pitchFamily="2" charset="2"/>
+              <a:buChar char="ü"/>
+            </a:pPr>
+            <a:r>
+              <a:rPr lang="pt-BR" dirty="0">
+                <a:solidFill>
+                  <a:schemeClr val="tx1">
+                    <a:lumMod val="85000"/>
+                    <a:lumOff val="15000"/>
+                  </a:schemeClr>
+                </a:solidFill>
+                <a:latin typeface="Arial" panose="020B0604020202020204" pitchFamily="34" charset="0"/>
+                <a:cs typeface="Arial" panose="020B0604020202020204" pitchFamily="34" charset="0"/>
+              </a:rPr>
+              <a:t>Utiliza apenas Java</a:t>
+            </a:r>
+          </a:p>
+          <a:p>
+            <a:pPr marL="285750" indent="-285750" algn="just">
+              <a:buClr>
+                <a:srgbClr val="00B050"/>
+              </a:buClr>
+              <a:buFont typeface="Wingdings" panose="05000000000000000000" pitchFamily="2" charset="2"/>
+              <a:buChar char="ü"/>
+            </a:pPr>
+            <a:r>
+              <a:rPr lang="pt-BR" dirty="0">
+                <a:solidFill>
+                  <a:schemeClr val="tx1">
+                    <a:lumMod val="85000"/>
+                    <a:lumOff val="15000"/>
+                  </a:schemeClr>
+                </a:solidFill>
+                <a:latin typeface="Arial" panose="020B0604020202020204" pitchFamily="34" charset="0"/>
+                <a:cs typeface="Arial" panose="020B0604020202020204" pitchFamily="34" charset="0"/>
+              </a:rPr>
+              <a:t>Foco no objetivo principal da aplicação</a:t>
+            </a:r>
+          </a:p>
+          <a:p>
+            <a:pPr marL="285750" indent="-285750" algn="just">
+              <a:buClr>
+                <a:srgbClr val="00B050"/>
+              </a:buClr>
+              <a:buFont typeface="Wingdings" panose="05000000000000000000" pitchFamily="2" charset="2"/>
+              <a:buChar char="ü"/>
+            </a:pPr>
+            <a:r>
+              <a:rPr lang="pt-BR" dirty="0">
+                <a:solidFill>
+                  <a:schemeClr val="tx1">
+                    <a:lumMod val="85000"/>
+                    <a:lumOff val="15000"/>
+                  </a:schemeClr>
+                </a:solidFill>
+                <a:latin typeface="Arial" panose="020B0604020202020204" pitchFamily="34" charset="0"/>
+                <a:cs typeface="Arial" panose="020B0604020202020204" pitchFamily="34" charset="0"/>
+              </a:rPr>
+              <a:t>Facilidade para aplicar</a:t>
+            </a:r>
+          </a:p>
+          <a:p>
+            <a:pPr marL="285750" indent="-285750" algn="just">
+              <a:buClr>
+                <a:srgbClr val="C00000"/>
+              </a:buClr>
+              <a:buFont typeface="Arial" panose="020B0604020202020204" pitchFamily="34" charset="0"/>
+              <a:buChar char="X"/>
+            </a:pPr>
+            <a:endParaRPr lang="pt-BR" dirty="0">
+              <a:solidFill>
+                <a:schemeClr val="tx1">
+                  <a:lumMod val="85000"/>
+                  <a:lumOff val="15000"/>
+                </a:schemeClr>
+              </a:solidFill>
+              <a:latin typeface="Arial" panose="020B0604020202020204" pitchFamily="34" charset="0"/>
+              <a:cs typeface="Arial" panose="020B0604020202020204" pitchFamily="34" charset="0"/>
+            </a:endParaRPr>
+          </a:p>
+        </p:txBody>
+      </p:sp>
+    </p:spTree>
+    <p:extLst>
+      <p:ext uri="{BB962C8B-B14F-4D97-AF65-F5344CB8AC3E}">
+        <p14:creationId xmlns:p14="http://schemas.microsoft.com/office/powerpoint/2010/main" val="1218319997"/>
+      </p:ext>
+    </p:extLst>
+  </p:cSld>
+  <p:clrMapOvr>
+    <a:masterClrMapping/>
+  </p:clrMapOvr>
+  <p:transition spd="slow">
+    <p:cover/>
+  </p:transition>
+</p:sld>
+</file>
+
+<file path=ppt/slides/slide8.xml><?xml version="1.0" encoding="utf-8"?>
+<p:sld xmlns:a="http://schemas.openxmlformats.org/drawingml/2006/main" xmlns:r="http://schemas.openxmlformats.org/officeDocument/2006/relationships" xmlns:p="http://schemas.openxmlformats.org/presentationml/2006/main">
+  <p:cSld>
+    <p:spTree>
+      <p:nvGrpSpPr>
+        <p:cNvPr id="1" name=""/>
+        <p:cNvGrpSpPr/>
+        <p:nvPr/>
+      </p:nvGrpSpPr>
+      <p:grpSpPr>
+        <a:xfrm>
+          <a:off x="0" y="0"/>
+          <a:ext cx="0" cy="0"/>
+          <a:chOff x="0" y="0"/>
+          <a:chExt cx="0" cy="0"/>
+        </a:xfrm>
+      </p:grpSpPr>
       <p:graphicFrame>
         <p:nvGraphicFramePr>
           <p:cNvPr id="4" name="Tabela 3"/>
@@ -3774,275 +4043,6 @@
     <p:extLst>
       <p:ext uri="{BB962C8B-B14F-4D97-AF65-F5344CB8AC3E}">
         <p14:creationId xmlns:p14="http://schemas.microsoft.com/office/powerpoint/2010/main" val="1708334736"/>
-      </p:ext>
-    </p:extLst>
-  </p:cSld>
-  <p:clrMapOvr>
-    <a:masterClrMapping/>
-  </p:clrMapOvr>
-  <p:transition spd="slow">
-    <p:cover/>
-  </p:transition>
-</p:sld>
-</file>
-
-<file path=ppt/slides/slide8.xml><?xml version="1.0" encoding="utf-8"?>
-<p:sld xmlns:a="http://schemas.openxmlformats.org/drawingml/2006/main" xmlns:r="http://schemas.openxmlformats.org/officeDocument/2006/relationships" xmlns:p="http://schemas.openxmlformats.org/presentationml/2006/main">
-  <p:cSld>
-    <p:spTree>
-      <p:nvGrpSpPr>
-        <p:cNvPr id="1" name=""/>
-        <p:cNvGrpSpPr/>
-        <p:nvPr/>
-      </p:nvGrpSpPr>
-      <p:grpSpPr>
-        <a:xfrm>
-          <a:off x="0" y="0"/>
-          <a:ext cx="0" cy="0"/>
-          <a:chOff x="0" y="0"/>
-          <a:chExt cx="0" cy="0"/>
-        </a:xfrm>
-      </p:grpSpPr>
-      <p:sp>
-        <p:nvSpPr>
-          <p:cNvPr id="2" name="TextBox 1"/>
-          <p:cNvSpPr txBox="1">
-            <a:spLocks noChangeArrowheads="1"/>
-          </p:cNvSpPr>
-          <p:nvPr/>
-        </p:nvSpPr>
-        <p:spPr bwMode="auto">
-          <a:xfrm>
-            <a:off x="1588" y="125219"/>
-            <a:ext cx="9142412" cy="646331"/>
-          </a:xfrm>
-          <a:prstGeom prst="rect">
-            <a:avLst/>
-          </a:prstGeom>
-          <a:noFill/>
-          <a:ln w="9525">
-            <a:noFill/>
-            <a:miter lim="800000"/>
-            <a:headEnd/>
-            <a:tailEnd/>
-          </a:ln>
-        </p:spPr>
-        <p:txBody>
-          <a:bodyPr wrap="square">
-            <a:spAutoFit/>
-          </a:bodyPr>
-          <a:lstStyle/>
-          <a:p>
-            <a:r>
-              <a:rPr lang="en-US" altLang="ko-KR" sz="3600" b="1" dirty="0">
-                <a:solidFill>
-                  <a:schemeClr val="tx1">
-                    <a:lumMod val="65000"/>
-                    <a:lumOff val="35000"/>
-                  </a:schemeClr>
-                </a:solidFill>
-                <a:latin typeface="Arial" pitchFamily="34" charset="0"/>
-                <a:ea typeface="맑은 고딕" pitchFamily="50" charset="-127"/>
-                <a:cs typeface="Arial" pitchFamily="34" charset="0"/>
-              </a:rPr>
-              <a:t>  JAVA PERSISTENCE API</a:t>
-            </a:r>
-          </a:p>
-        </p:txBody>
-      </p:sp>
-      <p:sp>
-        <p:nvSpPr>
-          <p:cNvPr id="3" name="CaixaDeTexto 2"/>
-          <p:cNvSpPr txBox="1"/>
-          <p:nvPr/>
-        </p:nvSpPr>
-        <p:spPr>
-          <a:xfrm>
-            <a:off x="324322" y="1176254"/>
-            <a:ext cx="8496944" cy="2585323"/>
-          </a:xfrm>
-          <a:prstGeom prst="rect">
-            <a:avLst/>
-          </a:prstGeom>
-          <a:noFill/>
-        </p:spPr>
-        <p:txBody>
-          <a:bodyPr wrap="square" rtlCol="0">
-            <a:spAutoFit/>
-          </a:bodyPr>
-          <a:lstStyle/>
-          <a:p>
-            <a:pPr algn="just"/>
-            <a:r>
-              <a:rPr lang="pt-BR" dirty="0">
-                <a:solidFill>
-                  <a:schemeClr val="tx1">
-                    <a:lumMod val="85000"/>
-                    <a:lumOff val="15000"/>
-                  </a:schemeClr>
-                </a:solidFill>
-                <a:latin typeface="Arial" panose="020B0604020202020204" pitchFamily="34" charset="0"/>
-                <a:cs typeface="Arial" panose="020B0604020202020204" pitchFamily="34" charset="0"/>
-              </a:rPr>
-              <a:t>A Java </a:t>
-            </a:r>
-            <a:r>
-              <a:rPr lang="pt-BR" dirty="0" err="1">
-                <a:solidFill>
-                  <a:schemeClr val="tx1">
-                    <a:lumMod val="85000"/>
-                    <a:lumOff val="15000"/>
-                  </a:schemeClr>
-                </a:solidFill>
-                <a:latin typeface="Arial" panose="020B0604020202020204" pitchFamily="34" charset="0"/>
-                <a:cs typeface="Arial" panose="020B0604020202020204" pitchFamily="34" charset="0"/>
-              </a:rPr>
-              <a:t>Persistence</a:t>
-            </a:r>
-            <a:r>
-              <a:rPr lang="pt-BR" dirty="0">
-                <a:solidFill>
-                  <a:schemeClr val="tx1">
-                    <a:lumMod val="85000"/>
-                    <a:lumOff val="15000"/>
-                  </a:schemeClr>
-                </a:solidFill>
-                <a:latin typeface="Arial" panose="020B0604020202020204" pitchFamily="34" charset="0"/>
-                <a:cs typeface="Arial" panose="020B0604020202020204" pitchFamily="34" charset="0"/>
-              </a:rPr>
-              <a:t> API (JPA) é uma camada de abstração para persistência de dados, onde utilizamos anotações para realizar o mapeamento ORM e métodos abstraídos para manipular o banco de dados.</a:t>
-            </a:r>
-          </a:p>
-          <a:p>
-            <a:pPr algn="just">
-              <a:buClr>
-                <a:srgbClr val="C00000"/>
-              </a:buClr>
-            </a:pPr>
-            <a:endParaRPr lang="pt-BR" dirty="0">
-              <a:solidFill>
-                <a:schemeClr val="tx1">
-                  <a:lumMod val="85000"/>
-                  <a:lumOff val="15000"/>
-                </a:schemeClr>
-              </a:solidFill>
-              <a:latin typeface="Arial" panose="020B0604020202020204" pitchFamily="34" charset="0"/>
-              <a:cs typeface="Arial" panose="020B0604020202020204" pitchFamily="34" charset="0"/>
-            </a:endParaRPr>
-          </a:p>
-          <a:p>
-            <a:pPr marL="285750" indent="-285750" algn="just">
-              <a:buClr>
-                <a:srgbClr val="00B050"/>
-              </a:buClr>
-              <a:buFont typeface="Wingdings" panose="05000000000000000000" pitchFamily="2" charset="2"/>
-              <a:buChar char="ü"/>
-            </a:pPr>
-            <a:r>
-              <a:rPr lang="pt-BR" dirty="0">
-                <a:solidFill>
-                  <a:schemeClr val="tx1">
-                    <a:lumMod val="85000"/>
-                    <a:lumOff val="15000"/>
-                  </a:schemeClr>
-                </a:solidFill>
-                <a:latin typeface="Arial" panose="020B0604020202020204" pitchFamily="34" charset="0"/>
-                <a:cs typeface="Arial" panose="020B0604020202020204" pitchFamily="34" charset="0"/>
-              </a:rPr>
-              <a:t>Abstração em relação ao SGBD a ser utilizado</a:t>
-            </a:r>
-          </a:p>
-          <a:p>
-            <a:pPr marL="285750" indent="-285750" algn="just">
-              <a:buClr>
-                <a:srgbClr val="00B050"/>
-              </a:buClr>
-              <a:buFont typeface="Wingdings" panose="05000000000000000000" pitchFamily="2" charset="2"/>
-              <a:buChar char="ü"/>
-            </a:pPr>
-            <a:r>
-              <a:rPr lang="pt-BR" dirty="0">
-                <a:solidFill>
-                  <a:schemeClr val="tx1">
-                    <a:lumMod val="85000"/>
-                    <a:lumOff val="15000"/>
-                  </a:schemeClr>
-                </a:solidFill>
-                <a:latin typeface="Arial" panose="020B0604020202020204" pitchFamily="34" charset="0"/>
-                <a:cs typeface="Arial" panose="020B0604020202020204" pitchFamily="34" charset="0"/>
-              </a:rPr>
-              <a:t>Utiliza apenas Java</a:t>
-            </a:r>
-          </a:p>
-          <a:p>
-            <a:pPr marL="285750" indent="-285750" algn="just">
-              <a:buClr>
-                <a:srgbClr val="00B050"/>
-              </a:buClr>
-              <a:buFont typeface="Wingdings" panose="05000000000000000000" pitchFamily="2" charset="2"/>
-              <a:buChar char="ü"/>
-            </a:pPr>
-            <a:r>
-              <a:rPr lang="pt-BR" dirty="0">
-                <a:solidFill>
-                  <a:schemeClr val="tx1">
-                    <a:lumMod val="85000"/>
-                    <a:lumOff val="15000"/>
-                  </a:schemeClr>
-                </a:solidFill>
-                <a:latin typeface="Arial" panose="020B0604020202020204" pitchFamily="34" charset="0"/>
-                <a:cs typeface="Arial" panose="020B0604020202020204" pitchFamily="34" charset="0"/>
-              </a:rPr>
-              <a:t>Foco no objetivo principal da aplicação</a:t>
-            </a:r>
-          </a:p>
-          <a:p>
-            <a:pPr marL="285750" indent="-285750" algn="just">
-              <a:buClr>
-                <a:srgbClr val="00B050"/>
-              </a:buClr>
-              <a:buFont typeface="Wingdings" panose="05000000000000000000" pitchFamily="2" charset="2"/>
-              <a:buChar char="ü"/>
-            </a:pPr>
-            <a:r>
-              <a:rPr lang="pt-BR" dirty="0">
-                <a:solidFill>
-                  <a:schemeClr val="tx1">
-                    <a:lumMod val="85000"/>
-                    <a:lumOff val="15000"/>
-                  </a:schemeClr>
-                </a:solidFill>
-                <a:latin typeface="Arial" panose="020B0604020202020204" pitchFamily="34" charset="0"/>
-                <a:cs typeface="Arial" panose="020B0604020202020204" pitchFamily="34" charset="0"/>
-              </a:rPr>
-              <a:t>Facilidade para aplicar</a:t>
-            </a:r>
-          </a:p>
-          <a:p>
-            <a:pPr marL="285750" indent="-285750" algn="just">
-              <a:buClr>
-                <a:srgbClr val="C00000"/>
-              </a:buClr>
-              <a:buFont typeface="Arial" panose="020B0604020202020204" pitchFamily="34" charset="0"/>
-              <a:buChar char="X"/>
-            </a:pPr>
-            <a:endParaRPr lang="pt-BR" dirty="0">
-              <a:solidFill>
-                <a:schemeClr val="tx1">
-                  <a:lumMod val="85000"/>
-                  <a:lumOff val="15000"/>
-                </a:schemeClr>
-              </a:solidFill>
-              <a:latin typeface="Arial" panose="020B0604020202020204" pitchFamily="34" charset="0"/>
-              <a:cs typeface="Arial" panose="020B0604020202020204" pitchFamily="34" charset="0"/>
-            </a:endParaRPr>
-          </a:p>
-        </p:txBody>
-      </p:sp>
-    </p:spTree>
-    <p:extLst>
-      <p:ext uri="{BB962C8B-B14F-4D97-AF65-F5344CB8AC3E}">
-        <p14:creationId xmlns:p14="http://schemas.microsoft.com/office/powerpoint/2010/main" val="1218319997"/>
       </p:ext>
     </p:extLst>
   </p:cSld>

</xml_diff>

<commit_message>
Slide 'prática' e 'fim'
</commit_message>
<xml_diff>
--- a/Apresentação.pptx
+++ b/Apresentação.pptx
@@ -5,7 +5,7 @@
     <p:sldMasterId id="2147483648" r:id="rId1"/>
   </p:sldMasterIdLst>
   <p:notesMasterIdLst>
-    <p:notesMasterId r:id="rId13"/>
+    <p:notesMasterId r:id="rId15"/>
   </p:notesMasterIdLst>
   <p:sldIdLst>
     <p:sldId id="256" r:id="rId2"/>
@@ -19,6 +19,8 @@
     <p:sldId id="264" r:id="rId10"/>
     <p:sldId id="265" r:id="rId11"/>
     <p:sldId id="266" r:id="rId12"/>
+    <p:sldId id="267" r:id="rId13"/>
+    <p:sldId id="268" r:id="rId14"/>
   </p:sldIdLst>
   <p:sldSz cx="9144000" cy="5143500" type="screen16x9"/>
   <p:notesSz cx="6858000" cy="9144000"/>
@@ -644,6 +646,174 @@
     <p:extLst>
       <p:ext uri="{BB962C8B-B14F-4D97-AF65-F5344CB8AC3E}">
         <p14:creationId xmlns:p14="http://schemas.microsoft.com/office/powerpoint/2010/main" val="562068361"/>
+      </p:ext>
+    </p:extLst>
+  </p:cSld>
+  <p:clrMapOvr>
+    <a:masterClrMapping/>
+  </p:clrMapOvr>
+</p:notes>
+</file>
+
+<file path=ppt/notesSlides/notesSlide11.xml><?xml version="1.0" encoding="utf-8"?>
+<p:notes xmlns:a="http://schemas.openxmlformats.org/drawingml/2006/main" xmlns:r="http://schemas.openxmlformats.org/officeDocument/2006/relationships" xmlns:p="http://schemas.openxmlformats.org/presentationml/2006/main">
+  <p:cSld>
+    <p:spTree>
+      <p:nvGrpSpPr>
+        <p:cNvPr id="1" name=""/>
+        <p:cNvGrpSpPr/>
+        <p:nvPr/>
+      </p:nvGrpSpPr>
+      <p:grpSpPr>
+        <a:xfrm>
+          <a:off x="0" y="0"/>
+          <a:ext cx="0" cy="0"/>
+          <a:chOff x="0" y="0"/>
+          <a:chExt cx="0" cy="0"/>
+        </a:xfrm>
+      </p:grpSpPr>
+      <p:sp>
+        <p:nvSpPr>
+          <p:cNvPr id="2" name="Espaço Reservado para Imagem de Slide 1"/>
+          <p:cNvSpPr>
+            <a:spLocks noGrp="1" noRot="1" noChangeAspect="1"/>
+          </p:cNvSpPr>
+          <p:nvPr>
+            <p:ph type="sldImg"/>
+          </p:nvPr>
+        </p:nvSpPr>
+        <p:spPr/>
+      </p:sp>
+      <p:sp>
+        <p:nvSpPr>
+          <p:cNvPr id="3" name="Espaço Reservado para Anotações 2"/>
+          <p:cNvSpPr>
+            <a:spLocks noGrp="1"/>
+          </p:cNvSpPr>
+          <p:nvPr>
+            <p:ph type="body" idx="1"/>
+          </p:nvPr>
+        </p:nvSpPr>
+        <p:spPr/>
+        <p:txBody>
+          <a:bodyPr/>
+          <a:lstStyle/>
+          <a:p>
+            <a:endParaRPr lang="pt-BR" dirty="0"/>
+          </a:p>
+        </p:txBody>
+      </p:sp>
+      <p:sp>
+        <p:nvSpPr>
+          <p:cNvPr id="4" name="Espaço Reservado para Número de Slide 3"/>
+          <p:cNvSpPr>
+            <a:spLocks noGrp="1"/>
+          </p:cNvSpPr>
+          <p:nvPr>
+            <p:ph type="sldNum" sz="quarter" idx="10"/>
+          </p:nvPr>
+        </p:nvSpPr>
+        <p:spPr/>
+        <p:txBody>
+          <a:bodyPr/>
+          <a:lstStyle/>
+          <a:p>
+            <a:fld id="{5374EABB-B752-462A-8FDC-DA8F402C3A13}" type="slidenum">
+              <a:rPr lang="pt-BR" smtClean="0"/>
+              <a:t>12</a:t>
+            </a:fld>
+            <a:endParaRPr lang="pt-BR"/>
+          </a:p>
+        </p:txBody>
+      </p:sp>
+    </p:spTree>
+    <p:extLst>
+      <p:ext uri="{BB962C8B-B14F-4D97-AF65-F5344CB8AC3E}">
+        <p14:creationId xmlns:p14="http://schemas.microsoft.com/office/powerpoint/2010/main" val="3669237519"/>
+      </p:ext>
+    </p:extLst>
+  </p:cSld>
+  <p:clrMapOvr>
+    <a:masterClrMapping/>
+  </p:clrMapOvr>
+</p:notes>
+</file>
+
+<file path=ppt/notesSlides/notesSlide12.xml><?xml version="1.0" encoding="utf-8"?>
+<p:notes xmlns:a="http://schemas.openxmlformats.org/drawingml/2006/main" xmlns:r="http://schemas.openxmlformats.org/officeDocument/2006/relationships" xmlns:p="http://schemas.openxmlformats.org/presentationml/2006/main">
+  <p:cSld>
+    <p:spTree>
+      <p:nvGrpSpPr>
+        <p:cNvPr id="1" name=""/>
+        <p:cNvGrpSpPr/>
+        <p:nvPr/>
+      </p:nvGrpSpPr>
+      <p:grpSpPr>
+        <a:xfrm>
+          <a:off x="0" y="0"/>
+          <a:ext cx="0" cy="0"/>
+          <a:chOff x="0" y="0"/>
+          <a:chExt cx="0" cy="0"/>
+        </a:xfrm>
+      </p:grpSpPr>
+      <p:sp>
+        <p:nvSpPr>
+          <p:cNvPr id="2" name="Espaço Reservado para Imagem de Slide 1"/>
+          <p:cNvSpPr>
+            <a:spLocks noGrp="1" noRot="1" noChangeAspect="1"/>
+          </p:cNvSpPr>
+          <p:nvPr>
+            <p:ph type="sldImg"/>
+          </p:nvPr>
+        </p:nvSpPr>
+        <p:spPr/>
+      </p:sp>
+      <p:sp>
+        <p:nvSpPr>
+          <p:cNvPr id="3" name="Espaço Reservado para Anotações 2"/>
+          <p:cNvSpPr>
+            <a:spLocks noGrp="1"/>
+          </p:cNvSpPr>
+          <p:nvPr>
+            <p:ph type="body" idx="1"/>
+          </p:nvPr>
+        </p:nvSpPr>
+        <p:spPr/>
+        <p:txBody>
+          <a:bodyPr/>
+          <a:lstStyle/>
+          <a:p>
+            <a:endParaRPr lang="pt-BR" dirty="0"/>
+          </a:p>
+        </p:txBody>
+      </p:sp>
+      <p:sp>
+        <p:nvSpPr>
+          <p:cNvPr id="4" name="Espaço Reservado para Número de Slide 3"/>
+          <p:cNvSpPr>
+            <a:spLocks noGrp="1"/>
+          </p:cNvSpPr>
+          <p:nvPr>
+            <p:ph type="sldNum" sz="quarter" idx="10"/>
+          </p:nvPr>
+        </p:nvSpPr>
+        <p:spPr/>
+        <p:txBody>
+          <a:bodyPr/>
+          <a:lstStyle/>
+          <a:p>
+            <a:fld id="{5374EABB-B752-462A-8FDC-DA8F402C3A13}" type="slidenum">
+              <a:rPr lang="pt-BR" smtClean="0"/>
+              <a:t>13</a:t>
+            </a:fld>
+            <a:endParaRPr lang="pt-BR"/>
+          </a:p>
+        </p:txBody>
+      </p:sp>
+    </p:spTree>
+    <p:extLst>
+      <p:ext uri="{BB962C8B-B14F-4D97-AF65-F5344CB8AC3E}">
+        <p14:creationId xmlns:p14="http://schemas.microsoft.com/office/powerpoint/2010/main" val="3198291751"/>
       </p:ext>
     </p:extLst>
   </p:cSld>
@@ -2372,6 +2542,332 @@
     <p:extLst>
       <p:ext uri="{BB962C8B-B14F-4D97-AF65-F5344CB8AC3E}">
         <p14:creationId xmlns:p14="http://schemas.microsoft.com/office/powerpoint/2010/main" val="4021511116"/>
+      </p:ext>
+    </p:extLst>
+  </p:cSld>
+  <p:clrMapOvr>
+    <a:masterClrMapping/>
+  </p:clrMapOvr>
+  <p:transition spd="slow">
+    <p:cover/>
+  </p:transition>
+</p:sld>
+</file>
+
+<file path=ppt/slides/slide12.xml><?xml version="1.0" encoding="utf-8"?>
+<p:sld xmlns:a="http://schemas.openxmlformats.org/drawingml/2006/main" xmlns:r="http://schemas.openxmlformats.org/officeDocument/2006/relationships" xmlns:p="http://schemas.openxmlformats.org/presentationml/2006/main">
+  <p:cSld>
+    <p:spTree>
+      <p:nvGrpSpPr>
+        <p:cNvPr id="1" name=""/>
+        <p:cNvGrpSpPr/>
+        <p:nvPr/>
+      </p:nvGrpSpPr>
+      <p:grpSpPr>
+        <a:xfrm>
+          <a:off x="0" y="0"/>
+          <a:ext cx="0" cy="0"/>
+          <a:chOff x="0" y="0"/>
+          <a:chExt cx="0" cy="0"/>
+        </a:xfrm>
+      </p:grpSpPr>
+      <p:sp>
+        <p:nvSpPr>
+          <p:cNvPr id="2" name="TextBox 1"/>
+          <p:cNvSpPr txBox="1">
+            <a:spLocks noChangeArrowheads="1"/>
+          </p:cNvSpPr>
+          <p:nvPr/>
+        </p:nvSpPr>
+        <p:spPr bwMode="auto">
+          <a:xfrm>
+            <a:off x="1588" y="1707654"/>
+            <a:ext cx="9142412" cy="646331"/>
+          </a:xfrm>
+          <a:prstGeom prst="rect">
+            <a:avLst/>
+          </a:prstGeom>
+          <a:noFill/>
+          <a:ln w="9525">
+            <a:noFill/>
+            <a:miter lim="800000"/>
+            <a:headEnd/>
+            <a:tailEnd/>
+          </a:ln>
+        </p:spPr>
+        <p:txBody>
+          <a:bodyPr wrap="square">
+            <a:spAutoFit/>
+          </a:bodyPr>
+          <a:lstStyle/>
+          <a:p>
+            <a:pPr algn="ctr"/>
+            <a:r>
+              <a:rPr lang="en-US" altLang="ko-KR" sz="3600" b="1" dirty="0">
+                <a:solidFill>
+                  <a:schemeClr val="tx1">
+                    <a:lumMod val="65000"/>
+                    <a:lumOff val="35000"/>
+                  </a:schemeClr>
+                </a:solidFill>
+                <a:latin typeface="Arial" pitchFamily="34" charset="0"/>
+                <a:ea typeface="맑은 고딕" pitchFamily="50" charset="-127"/>
+                <a:cs typeface="Arial" pitchFamily="34" charset="0"/>
+              </a:rPr>
+              <a:t>PRÁTICA…</a:t>
+            </a:r>
+          </a:p>
+        </p:txBody>
+      </p:sp>
+    </p:spTree>
+    <p:extLst>
+      <p:ext uri="{BB962C8B-B14F-4D97-AF65-F5344CB8AC3E}">
+        <p14:creationId xmlns:p14="http://schemas.microsoft.com/office/powerpoint/2010/main" val="1373705940"/>
+      </p:ext>
+    </p:extLst>
+  </p:cSld>
+  <p:clrMapOvr>
+    <a:masterClrMapping/>
+  </p:clrMapOvr>
+  <p:transition spd="slow">
+    <p:cover/>
+  </p:transition>
+</p:sld>
+</file>
+
+<file path=ppt/slides/slide13.xml><?xml version="1.0" encoding="utf-8"?>
+<p:sld xmlns:a="http://schemas.openxmlformats.org/drawingml/2006/main" xmlns:r="http://schemas.openxmlformats.org/officeDocument/2006/relationships" xmlns:p="http://schemas.openxmlformats.org/presentationml/2006/main">
+  <p:cSld>
+    <p:spTree>
+      <p:nvGrpSpPr>
+        <p:cNvPr id="1" name=""/>
+        <p:cNvGrpSpPr/>
+        <p:nvPr/>
+      </p:nvGrpSpPr>
+      <p:grpSpPr>
+        <a:xfrm>
+          <a:off x="0" y="0"/>
+          <a:ext cx="0" cy="0"/>
+          <a:chOff x="0" y="0"/>
+          <a:chExt cx="0" cy="0"/>
+        </a:xfrm>
+      </p:grpSpPr>
+      <p:sp>
+        <p:nvSpPr>
+          <p:cNvPr id="2" name="TextBox 1"/>
+          <p:cNvSpPr txBox="1">
+            <a:spLocks noChangeArrowheads="1"/>
+          </p:cNvSpPr>
+          <p:nvPr/>
+        </p:nvSpPr>
+        <p:spPr bwMode="auto">
+          <a:xfrm>
+            <a:off x="1588" y="125219"/>
+            <a:ext cx="9142412" cy="646331"/>
+          </a:xfrm>
+          <a:prstGeom prst="rect">
+            <a:avLst/>
+          </a:prstGeom>
+          <a:noFill/>
+          <a:ln w="9525">
+            <a:noFill/>
+            <a:miter lim="800000"/>
+            <a:headEnd/>
+            <a:tailEnd/>
+          </a:ln>
+        </p:spPr>
+        <p:txBody>
+          <a:bodyPr wrap="square">
+            <a:spAutoFit/>
+          </a:bodyPr>
+          <a:lstStyle/>
+          <a:p>
+            <a:r>
+              <a:rPr lang="en-US" altLang="ko-KR" sz="3600" b="1" dirty="0">
+                <a:solidFill>
+                  <a:schemeClr val="tx1">
+                    <a:lumMod val="65000"/>
+                    <a:lumOff val="35000"/>
+                  </a:schemeClr>
+                </a:solidFill>
+                <a:latin typeface="Arial" pitchFamily="34" charset="0"/>
+                <a:ea typeface="맑은 고딕" pitchFamily="50" charset="-127"/>
+                <a:cs typeface="Arial" pitchFamily="34" charset="0"/>
+              </a:rPr>
+              <a:t>  FIM</a:t>
+            </a:r>
+          </a:p>
+        </p:txBody>
+      </p:sp>
+      <p:sp>
+        <p:nvSpPr>
+          <p:cNvPr id="3" name="CaixaDeTexto 2"/>
+          <p:cNvSpPr txBox="1"/>
+          <p:nvPr/>
+        </p:nvSpPr>
+        <p:spPr>
+          <a:xfrm>
+            <a:off x="324322" y="1176254"/>
+            <a:ext cx="8496944" cy="2308324"/>
+          </a:xfrm>
+          <a:prstGeom prst="rect">
+            <a:avLst/>
+          </a:prstGeom>
+          <a:noFill/>
+        </p:spPr>
+        <p:txBody>
+          <a:bodyPr wrap="square" rtlCol="0">
+            <a:spAutoFit/>
+          </a:bodyPr>
+          <a:lstStyle/>
+          <a:p>
+            <a:pPr algn="just"/>
+            <a:r>
+              <a:rPr lang="pt-BR" dirty="0">
+                <a:solidFill>
+                  <a:schemeClr val="tx1">
+                    <a:lumMod val="85000"/>
+                    <a:lumOff val="15000"/>
+                  </a:schemeClr>
+                </a:solidFill>
+                <a:latin typeface="Arial" panose="020B0604020202020204" pitchFamily="34" charset="0"/>
+                <a:cs typeface="Arial" panose="020B0604020202020204" pitchFamily="34" charset="0"/>
+              </a:rPr>
+              <a:t>Código fonte do projeto desenvolvido e apresentação no seguinte repositório:</a:t>
+            </a:r>
+          </a:p>
+          <a:p>
+            <a:pPr algn="just"/>
+            <a:endParaRPr lang="pt-BR" dirty="0">
+              <a:solidFill>
+                <a:schemeClr val="tx1">
+                  <a:lumMod val="85000"/>
+                  <a:lumOff val="15000"/>
+                </a:schemeClr>
+              </a:solidFill>
+              <a:latin typeface="Arial" panose="020B0604020202020204" pitchFamily="34" charset="0"/>
+              <a:cs typeface="Arial" panose="020B0604020202020204" pitchFamily="34" charset="0"/>
+            </a:endParaRPr>
+          </a:p>
+          <a:p>
+            <a:pPr algn="just"/>
+            <a:r>
+              <a:rPr lang="pt-BR" dirty="0">
+                <a:solidFill>
+                  <a:schemeClr val="bg1">
+                    <a:lumMod val="50000"/>
+                  </a:schemeClr>
+                </a:solidFill>
+                <a:latin typeface="Arial" panose="020B0604020202020204" pitchFamily="34" charset="0"/>
+                <a:cs typeface="Arial" panose="020B0604020202020204" pitchFamily="34" charset="0"/>
+                <a:hlinkClick r:id="rId3"/>
+              </a:rPr>
+              <a:t>https://github.com/DeehSlash/apresentacao-jpa</a:t>
+            </a:r>
+            <a:endParaRPr lang="pt-BR" dirty="0">
+              <a:solidFill>
+                <a:schemeClr val="bg1">
+                  <a:lumMod val="50000"/>
+                </a:schemeClr>
+              </a:solidFill>
+              <a:latin typeface="Arial" panose="020B0604020202020204" pitchFamily="34" charset="0"/>
+              <a:cs typeface="Arial" panose="020B0604020202020204" pitchFamily="34" charset="0"/>
+            </a:endParaRPr>
+          </a:p>
+          <a:p>
+            <a:pPr algn="just"/>
+            <a:endParaRPr lang="pt-BR" dirty="0">
+              <a:solidFill>
+                <a:schemeClr val="tx1">
+                  <a:lumMod val="85000"/>
+                  <a:lumOff val="15000"/>
+                </a:schemeClr>
+              </a:solidFill>
+              <a:latin typeface="Arial" panose="020B0604020202020204" pitchFamily="34" charset="0"/>
+              <a:cs typeface="Arial" panose="020B0604020202020204" pitchFamily="34" charset="0"/>
+            </a:endParaRPr>
+          </a:p>
+          <a:p>
+            <a:pPr algn="just"/>
+            <a:r>
+              <a:rPr lang="pt-BR" dirty="0">
+                <a:solidFill>
+                  <a:schemeClr val="tx1">
+                    <a:lumMod val="85000"/>
+                    <a:lumOff val="15000"/>
+                  </a:schemeClr>
+                </a:solidFill>
+                <a:latin typeface="Arial" panose="020B0604020202020204" pitchFamily="34" charset="0"/>
+                <a:cs typeface="Arial" panose="020B0604020202020204" pitchFamily="34" charset="0"/>
+              </a:rPr>
+              <a:t>Endereço encurtado:</a:t>
+            </a:r>
+          </a:p>
+          <a:p>
+            <a:pPr algn="just"/>
+            <a:endParaRPr lang="pt-BR" dirty="0">
+              <a:solidFill>
+                <a:schemeClr val="tx1">
+                  <a:lumMod val="85000"/>
+                  <a:lumOff val="15000"/>
+                </a:schemeClr>
+              </a:solidFill>
+              <a:latin typeface="Arial" panose="020B0604020202020204" pitchFamily="34" charset="0"/>
+              <a:cs typeface="Arial" panose="020B0604020202020204" pitchFamily="34" charset="0"/>
+            </a:endParaRPr>
+          </a:p>
+          <a:p>
+            <a:pPr algn="just"/>
+            <a:r>
+              <a:rPr lang="pt-BR" dirty="0">
+                <a:solidFill>
+                  <a:schemeClr val="tx1">
+                    <a:lumMod val="85000"/>
+                    <a:lumOff val="15000"/>
+                  </a:schemeClr>
+                </a:solidFill>
+                <a:latin typeface="Arial" panose="020B0604020202020204" pitchFamily="34" charset="0"/>
+                <a:cs typeface="Arial" panose="020B0604020202020204" pitchFamily="34" charset="0"/>
+                <a:hlinkClick r:id="rId4"/>
+              </a:rPr>
+              <a:t>http://bit.ly/apresentacao-jpa</a:t>
+            </a:r>
+            <a:endParaRPr lang="pt-BR" dirty="0">
+              <a:solidFill>
+                <a:schemeClr val="tx1">
+                  <a:lumMod val="85000"/>
+                  <a:lumOff val="15000"/>
+                </a:schemeClr>
+              </a:solidFill>
+              <a:latin typeface="Arial" panose="020B0604020202020204" pitchFamily="34" charset="0"/>
+              <a:cs typeface="Arial" panose="020B0604020202020204" pitchFamily="34" charset="0"/>
+            </a:endParaRPr>
+          </a:p>
+          <a:p>
+            <a:pPr marL="285750" indent="-285750" algn="just">
+              <a:buClr>
+                <a:srgbClr val="C00000"/>
+              </a:buClr>
+              <a:buFont typeface="Arial" panose="020B0604020202020204" pitchFamily="34" charset="0"/>
+              <a:buChar char="X"/>
+            </a:pPr>
+            <a:endParaRPr lang="pt-BR" dirty="0">
+              <a:solidFill>
+                <a:schemeClr val="tx1">
+                  <a:lumMod val="85000"/>
+                  <a:lumOff val="15000"/>
+                </a:schemeClr>
+              </a:solidFill>
+              <a:latin typeface="Arial" panose="020B0604020202020204" pitchFamily="34" charset="0"/>
+              <a:cs typeface="Arial" panose="020B0604020202020204" pitchFamily="34" charset="0"/>
+            </a:endParaRPr>
+          </a:p>
+        </p:txBody>
+      </p:sp>
+    </p:spTree>
+    <p:extLst>
+      <p:ext uri="{BB962C8B-B14F-4D97-AF65-F5344CB8AC3E}">
+        <p14:creationId xmlns:p14="http://schemas.microsoft.com/office/powerpoint/2010/main" val="3604046926"/>
       </p:ext>
     </p:extLst>
   </p:cSld>

</xml_diff>

<commit_message>
Fix quebras de linhas
</commit_message>
<xml_diff>
--- a/Apresentação.pptx
+++ b/Apresentação.pptx
@@ -221,7 +221,7 @@
           <a:p>
             <a:fld id="{E4675A0C-EE4F-4DC1-AF59-C786325D5A31}" type="datetimeFigureOut">
               <a:rPr lang="pt-BR" smtClean="0"/>
-              <a:t>22/04/2017</a:t>
+              <a:t>24/04/2017</a:t>
             </a:fld>
             <a:endParaRPr lang="pt-BR"/>
           </a:p>
@@ -2523,7 +2523,39 @@
                 <a:latin typeface="Arial" panose="020B0604020202020204" pitchFamily="34" charset="0"/>
                 <a:cs typeface="Arial" panose="020B0604020202020204" pitchFamily="34" charset="0"/>
               </a:rPr>
-              <a:t>A JPA é uma API que descreve uma interface comum para Frameworks de persistência de dados, portanto necessita de uma implementação. Alguns exemplos de implementações são:</a:t>
+              <a:t>A JPA é uma API que descreve uma interface comum para Frameworks de </a:t>
+            </a:r>
+          </a:p>
+          <a:p>
+            <a:pPr algn="just"/>
+            <a:r>
+              <a:rPr lang="pt-BR" dirty="0">
+                <a:solidFill>
+                  <a:schemeClr val="tx1">
+                    <a:lumMod val="85000"/>
+                    <a:lumOff val="15000"/>
+                  </a:schemeClr>
+                </a:solidFill>
+                <a:latin typeface="Arial" panose="020B0604020202020204" pitchFamily="34" charset="0"/>
+                <a:cs typeface="Arial" panose="020B0604020202020204" pitchFamily="34" charset="0"/>
+              </a:rPr>
+              <a:t>persistência de dados, portanto necessita de uma implementação. Alguns </a:t>
+            </a:r>
+          </a:p>
+          <a:p>
+            <a:pPr algn="just"/>
+            <a:r>
+              <a:rPr lang="pt-BR" dirty="0">
+                <a:solidFill>
+                  <a:schemeClr val="tx1">
+                    <a:lumMod val="85000"/>
+                    <a:lumOff val="15000"/>
+                  </a:schemeClr>
+                </a:solidFill>
+                <a:latin typeface="Arial" panose="020B0604020202020204" pitchFamily="34" charset="0"/>
+                <a:cs typeface="Arial" panose="020B0604020202020204" pitchFamily="34" charset="0"/>
+              </a:rPr>
+              <a:t>exemplos de implementações são:</a:t>
             </a:r>
           </a:p>
           <a:p>
@@ -3388,7 +3420,23 @@
                 <a:latin typeface="Arial" panose="020B0604020202020204" pitchFamily="34" charset="0"/>
                 <a:cs typeface="Arial" panose="020B0604020202020204" pitchFamily="34" charset="0"/>
               </a:rPr>
-              <a:t>A persistência é um conceito fundamental em muitas aplicações, pois permite que o programa persista os dados mesmo após ser encerrado, recuperando-os ao iniciar novamente.</a:t>
+              <a:t>A persistência é um conceito fundamental em muitas aplicações, pois permite que o programa persista os dados após ser encerrado, recuperando-os ao iniciar </a:t>
+            </a:r>
+          </a:p>
+          <a:p>
+            <a:pPr algn="just"/>
+            <a:r>
+              <a:rPr lang="pt-BR" dirty="0">
+                <a:solidFill>
+                  <a:schemeClr val="tx1">
+                    <a:lumMod val="85000"/>
+                    <a:lumOff val="15000"/>
+                  </a:schemeClr>
+                </a:solidFill>
+                <a:latin typeface="Arial" panose="020B0604020202020204" pitchFamily="34" charset="0"/>
+                <a:cs typeface="Arial" panose="020B0604020202020204" pitchFamily="34" charset="0"/>
+              </a:rPr>
+              <a:t>novamente.</a:t>
             </a:r>
           </a:p>
         </p:txBody>
@@ -3601,7 +3649,7 @@
         <p:spPr>
           <a:xfrm>
             <a:off x="324322" y="1176254"/>
-            <a:ext cx="8496944" cy="3970318"/>
+            <a:ext cx="8496944" cy="4247317"/>
           </a:xfrm>
           <a:prstGeom prst="rect">
             <a:avLst/>
@@ -3881,6 +3929,28 @@
                 <a:cs typeface="Arial" panose="020B0604020202020204" pitchFamily="34" charset="0"/>
               </a:rPr>
               <a:t>Implementação para um SGBD em específico</a:t>
+            </a:r>
+          </a:p>
+          <a:p>
+            <a:pPr marL="285750" indent="-285750" algn="just">
+              <a:buClr>
+                <a:srgbClr val="C00000"/>
+              </a:buClr>
+              <a:buFont typeface="Arial" panose="020B0604020202020204" pitchFamily="34" charset="0"/>
+              <a:buChar char="X"/>
+            </a:pPr>
+            <a:r>
+              <a:rPr lang="pt-BR" dirty="0">
+                <a:solidFill>
+                  <a:schemeClr val="tx1">
+                    <a:lumMod val="85000"/>
+                    <a:lumOff val="15000"/>
+                  </a:schemeClr>
+                </a:solidFill>
+                <a:latin typeface="Arial" panose="020B0604020202020204" pitchFamily="34" charset="0"/>
+                <a:cs typeface="Arial" panose="020B0604020202020204" pitchFamily="34" charset="0"/>
+              </a:rPr>
+              <a:t>Implementação extensiva</a:t>
             </a:r>
           </a:p>
           <a:p>
@@ -4247,7 +4317,39 @@
                 <a:latin typeface="Arial" panose="020B0604020202020204" pitchFamily="34" charset="0"/>
                 <a:cs typeface="Arial" panose="020B0604020202020204" pitchFamily="34" charset="0"/>
               </a:rPr>
-              <a:t> API (JPA) é uma camada de abstração para persistência de dados, onde utilizamos anotações para realizar o mapeamento ORM e métodos abstraídos para manipular o banco de dados.</a:t>
+              <a:t> API (JPA) é uma camada de abstração para persistência de</a:t>
+            </a:r>
+          </a:p>
+          <a:p>
+            <a:pPr algn="just"/>
+            <a:r>
+              <a:rPr lang="pt-BR" dirty="0">
+                <a:solidFill>
+                  <a:schemeClr val="tx1">
+                    <a:lumMod val="85000"/>
+                    <a:lumOff val="15000"/>
+                  </a:schemeClr>
+                </a:solidFill>
+                <a:latin typeface="Arial" panose="020B0604020202020204" pitchFamily="34" charset="0"/>
+                <a:cs typeface="Arial" panose="020B0604020202020204" pitchFamily="34" charset="0"/>
+              </a:rPr>
+              <a:t>dados, onde utilizamos anotações para realizar o mapeamento ORM e métodos</a:t>
+            </a:r>
+          </a:p>
+          <a:p>
+            <a:pPr algn="just"/>
+            <a:r>
+              <a:rPr lang="pt-BR" dirty="0">
+                <a:solidFill>
+                  <a:schemeClr val="tx1">
+                    <a:lumMod val="85000"/>
+                    <a:lumOff val="15000"/>
+                  </a:schemeClr>
+                </a:solidFill>
+                <a:latin typeface="Arial" panose="020B0604020202020204" pitchFamily="34" charset="0"/>
+                <a:cs typeface="Arial" panose="020B0604020202020204" pitchFamily="34" charset="0"/>
+              </a:rPr>
+              <a:t>abstraídos para manipular o banco de dados.</a:t>
             </a:r>
           </a:p>
           <a:p>
@@ -4568,10 +4670,13 @@
                 <a:latin typeface="Arial" panose="020B0604020202020204" pitchFamily="34" charset="0"/>
                 <a:cs typeface="Arial" panose="020B0604020202020204" pitchFamily="34" charset="0"/>
               </a:rPr>
-              <a:t>), isto é, não é necessário nada especial para tornar os objetos persistentes, apenas as </a:t>
-            </a:r>
-            <a:r>
-              <a:rPr lang="pt-BR">
+              <a:t>), isto é, </a:t>
+            </a:r>
+          </a:p>
+          <a:p>
+            <a:pPr algn="just"/>
+            <a:r>
+              <a:rPr lang="pt-BR" dirty="0">
                 <a:solidFill>
                   <a:schemeClr val="tx1">
                     <a:lumMod val="85000"/>
@@ -4581,8 +4686,11 @@
                 <a:latin typeface="Arial" panose="020B0604020202020204" pitchFamily="34" charset="0"/>
                 <a:cs typeface="Arial" panose="020B0604020202020204" pitchFamily="34" charset="0"/>
               </a:rPr>
-              <a:t>anotações de </a:t>
-            </a:r>
+              <a:t>não é necessário nada especial para tornar os objetos persistentes, apenas as </a:t>
+            </a:r>
+          </a:p>
+          <a:p>
+            <a:pPr algn="just"/>
             <a:r>
               <a:rPr lang="pt-BR" dirty="0">
                 <a:solidFill>
@@ -4594,7 +4702,7 @@
                 <a:latin typeface="Arial" panose="020B0604020202020204" pitchFamily="34" charset="0"/>
                 <a:cs typeface="Arial" panose="020B0604020202020204" pitchFamily="34" charset="0"/>
               </a:rPr>
-              <a:t>mapeamento objeto relacional.</a:t>
+              <a:t>anotações de mapeamento objeto relacional.</a:t>
             </a:r>
           </a:p>
         </p:txBody>
@@ -4978,7 +5086,39 @@
                 <a:latin typeface="Arial" panose="020B0604020202020204" pitchFamily="34" charset="0"/>
                 <a:cs typeface="Arial" panose="020B0604020202020204" pitchFamily="34" charset="0"/>
               </a:rPr>
-              <a:t>O mapeamento objeto relacional (ORM) é uma técnica de conversão de dados entre um banco de dados relacional e uma linguagem de programação orientada a objetos.</a:t>
+              <a:t>O mapeamento objeto relacional (ORM) é uma técnica de conversão de dados </a:t>
+            </a:r>
+          </a:p>
+          <a:p>
+            <a:pPr algn="just"/>
+            <a:r>
+              <a:rPr lang="pt-BR" dirty="0">
+                <a:solidFill>
+                  <a:schemeClr val="tx1">
+                    <a:lumMod val="85000"/>
+                    <a:lumOff val="15000"/>
+                  </a:schemeClr>
+                </a:solidFill>
+                <a:latin typeface="Arial" panose="020B0604020202020204" pitchFamily="34" charset="0"/>
+                <a:cs typeface="Arial" panose="020B0604020202020204" pitchFamily="34" charset="0"/>
+              </a:rPr>
+              <a:t>entre um banco de dados relacional e uma linguagem de programação </a:t>
+            </a:r>
+          </a:p>
+          <a:p>
+            <a:pPr algn="just"/>
+            <a:r>
+              <a:rPr lang="pt-BR" dirty="0">
+                <a:solidFill>
+                  <a:schemeClr val="tx1">
+                    <a:lumMod val="85000"/>
+                    <a:lumOff val="15000"/>
+                  </a:schemeClr>
+                </a:solidFill>
+                <a:latin typeface="Arial" panose="020B0604020202020204" pitchFamily="34" charset="0"/>
+                <a:cs typeface="Arial" panose="020B0604020202020204" pitchFamily="34" charset="0"/>
+              </a:rPr>
+              <a:t>orientada a objetos.</a:t>
             </a:r>
           </a:p>
         </p:txBody>

</xml_diff>

<commit_message>
Alteradas capturas de tela
</commit_message>
<xml_diff>
--- a/Apresentação.pptx
+++ b/Apresentação.pptx
@@ -2231,8 +2231,8 @@
         </p:blipFill>
         <p:spPr>
           <a:xfrm>
-            <a:off x="323444" y="1176256"/>
-            <a:ext cx="5904740" cy="2574578"/>
+            <a:off x="323528" y="771549"/>
+            <a:ext cx="6192688" cy="4240417"/>
           </a:xfrm>
           <a:prstGeom prst="rect">
             <a:avLst/>
@@ -2371,8 +2371,8 @@
         </p:blipFill>
         <p:spPr>
           <a:xfrm>
-            <a:off x="323444" y="1176255"/>
-            <a:ext cx="4752612" cy="3478569"/>
+            <a:off x="323528" y="1203598"/>
+            <a:ext cx="4752612" cy="3177865"/>
           </a:xfrm>
           <a:prstGeom prst="rect">
             <a:avLst/>

</xml_diff>